<commit_message>
added an add file method
</commit_message>
<xml_diff>
--- a/User stories.pptx
+++ b/User stories.pptx
@@ -3665,7 +3665,11 @@
               <a:buChar char="•"/>
             </a:pPr>
             <a:r>
-              <a:rPr lang="en-US" sz="2400" dirty="0" smtClean="0"/>
+              <a:rPr lang="en-US" sz="2400" dirty="0" smtClean="0">
+                <a:solidFill>
+                  <a:schemeClr val="accent6"/>
+                </a:solidFill>
+              </a:rPr>
               <a:t>Add file</a:t>
             </a:r>
           </a:p>

</xml_diff>

<commit_message>
added a delete file method
</commit_message>
<xml_diff>
--- a/User stories.pptx
+++ b/User stories.pptx
@@ -3679,7 +3679,11 @@
               <a:buChar char="•"/>
             </a:pPr>
             <a:r>
-              <a:rPr lang="en-US" sz="2400" dirty="0" smtClean="0"/>
+              <a:rPr lang="en-US" sz="2400" dirty="0" smtClean="0">
+                <a:solidFill>
+                  <a:schemeClr val="accent6"/>
+                </a:solidFill>
+              </a:rPr>
               <a:t>Delete file</a:t>
             </a:r>
           </a:p>

</xml_diff>

<commit_message>
added a search method
</commit_message>
<xml_diff>
--- a/User stories.pptx
+++ b/User stories.pptx
@@ -3693,7 +3693,11 @@
               <a:buChar char="•"/>
             </a:pPr>
             <a:r>
-              <a:rPr lang="en-US" sz="2400" dirty="0" smtClean="0"/>
+              <a:rPr lang="en-US" sz="2400" dirty="0" smtClean="0">
+                <a:solidFill>
+                  <a:schemeClr val="accent6"/>
+                </a:solidFill>
+              </a:rPr>
               <a:t>Search for file</a:t>
             </a:r>
           </a:p>

</xml_diff>